<commit_message>
final readme edits for P3 STR Aggregator
</commit_message>
<xml_diff>
--- a/screenshots/STR Aggro presentation 01152021.pptx
+++ b/screenshots/STR Aggro presentation 01152021.pptx
@@ -5198,7 +5198,7 @@
           <a:p>
             <a:r>
               <a:rPr lang="en-US" dirty="0"/>
-              <a:t>Code refactor – no controller; happens in the routes</a:t>
+              <a:t>Code refactor – no controller; happens in the routes (Created much confusion at the end…)</a:t>
             </a:r>
           </a:p>
           <a:p>
@@ -5230,6 +5230,28 @@
             </a:r>
           </a:p>
           <a:p>
+            <a:r>
+              <a:rPr lang="en-US" dirty="0"/>
+              <a:t>Highlighting the name of the page in the </a:t>
+            </a:r>
+            <a:r>
+              <a:rPr lang="en-US" dirty="0" err="1"/>
+              <a:t>NavBar</a:t>
+            </a:r>
+            <a:r>
+              <a:rPr lang="en-US" dirty="0"/>
+              <a:t> to show which page User is currently viewing</a:t>
+            </a:r>
+          </a:p>
+          <a:p>
+            <a:r>
+              <a:rPr lang="en-US" dirty="0"/>
+              <a:t>Budget page calculates total on Unit Cost and </a:t>
+            </a:r>
+            <a:r>
+              <a:rPr lang="en-US"/>
+              <a:t>not Total Cost</a:t>
+            </a:r>
             <a:endParaRPr lang="en-US" dirty="0"/>
           </a:p>
         </p:txBody>

</xml_diff>